<commit_message>
Added the API document.
</commit_message>
<xml_diff>
--- a/doc/designDoc.pptx
+++ b/doc/designDoc.pptx
@@ -104,6 +104,11 @@
       </a:defRPr>
     </a:lvl9pPr>
   </p:defaultTextStyle>
+  <p:extLst>
+    <p:ext uri="{EFAFB233-063F-42B5-8137-9DF3F51BA10A}">
+      <p15:sldGuideLst xmlns:p15="http://schemas.microsoft.com/office/powerpoint/2012/main"/>
+    </p:ext>
+  </p:extLst>
 </p:presentation>
 </file>
 
@@ -3357,7 +3362,7 @@
         <p:spPr>
           <a:xfrm>
             <a:off x="959555" y="4447823"/>
-            <a:ext cx="6434668" cy="993422"/>
+            <a:ext cx="6054193" cy="993422"/>
           </a:xfrm>
           <a:prstGeom prst="rect">
             <a:avLst/>
@@ -4024,8 +4029,8 @@
         </p:nvSpPr>
         <p:spPr>
           <a:xfrm>
-            <a:off x="5877614" y="4595499"/>
-            <a:ext cx="1406497" cy="276999"/>
+            <a:off x="5753872" y="4781501"/>
+            <a:ext cx="968786" cy="461665"/>
           </a:xfrm>
           <a:prstGeom prst="rect">
             <a:avLst/>
@@ -4067,8 +4072,8 @@
         </p:nvSpPr>
         <p:spPr>
           <a:xfrm>
-            <a:off x="5886933" y="5012334"/>
-            <a:ext cx="1110208" cy="276999"/>
+            <a:off x="4242388" y="5103597"/>
+            <a:ext cx="1110208" cy="246221"/>
           </a:xfrm>
           <a:prstGeom prst="rect">
             <a:avLst/>
@@ -4089,7 +4094,7 @@
           <a:lstStyle/>
           <a:p>
             <a:r>
-              <a:rPr lang="en-US" sz="1200" b="1" dirty="0"/>
+              <a:rPr lang="en-US" sz="1000" b="1" dirty="0"/>
               <a:t>URL Record  </a:t>
             </a:r>
             <a:endParaRPr lang="en-SG" sz="1000" b="1" dirty="0"/>
@@ -4321,7 +4326,7 @@
         <p:spPr>
           <a:xfrm>
             <a:off x="4034526" y="3884966"/>
-            <a:ext cx="2546337" cy="710533"/>
+            <a:ext cx="2203739" cy="896535"/>
           </a:xfrm>
           <a:prstGeom prst="straightConnector1">
             <a:avLst/>
@@ -4550,8 +4555,8 @@
         </p:nvCxnSpPr>
         <p:spPr>
           <a:xfrm flipV="1">
-            <a:off x="7394223" y="3429000"/>
-            <a:ext cx="361778" cy="1515534"/>
+            <a:off x="7013748" y="3429000"/>
+            <a:ext cx="742253" cy="1515534"/>
           </a:xfrm>
           <a:prstGeom prst="line">
             <a:avLst/>
@@ -4592,8 +4597,8 @@
         </p:nvCxnSpPr>
         <p:spPr>
           <a:xfrm>
-            <a:off x="7394223" y="4944534"/>
-            <a:ext cx="361778" cy="445497"/>
+            <a:off x="7013748" y="4944534"/>
+            <a:ext cx="742253" cy="445497"/>
           </a:xfrm>
           <a:prstGeom prst="line">
             <a:avLst/>
@@ -4692,6 +4697,49 @@
               <a:t>Output </a:t>
             </a:r>
             <a:endParaRPr lang="en-SG" sz="1400" b="1" dirty="0"/>
+          </a:p>
+        </p:txBody>
+      </p:sp>
+      <p:sp>
+        <p:nvSpPr>
+          <p:cNvPr id="2" name="TextBox 1">
+            <a:extLst>
+              <a:ext uri="{FF2B5EF4-FFF2-40B4-BE49-F238E27FC236}">
+                <a16:creationId xmlns:a16="http://schemas.microsoft.com/office/drawing/2014/main" id="{0ACE8DCB-C4DF-C4D4-D46A-B2716755D0C1}"/>
+              </a:ext>
+            </a:extLst>
+          </p:cNvPr>
+          <p:cNvSpPr txBox="1"/>
+          <p:nvPr/>
+        </p:nvSpPr>
+        <p:spPr>
+          <a:xfrm>
+            <a:off x="2981645" y="5103597"/>
+            <a:ext cx="1110208" cy="246221"/>
+          </a:xfrm>
+          <a:prstGeom prst="rect">
+            <a:avLst/>
+          </a:prstGeom>
+          <a:solidFill>
+            <a:schemeClr val="bg1"/>
+          </a:solidFill>
+          <a:ln w="3175">
+            <a:solidFill>
+              <a:schemeClr val="tx1"/>
+            </a:solidFill>
+          </a:ln>
+        </p:spPr>
+        <p:txBody>
+          <a:bodyPr wrap="square" rtlCol="0">
+            <a:spAutoFit/>
+          </a:bodyPr>
+          <a:lstStyle/>
+          <a:p>
+            <a:r>
+              <a:rPr lang="en-US" sz="1000" b="1" dirty="0"/>
+              <a:t>SSL certificate </a:t>
+            </a:r>
+            <a:endParaRPr lang="en-SG" sz="1000" b="1" dirty="0"/>
           </a:p>
         </p:txBody>
       </p:sp>

</xml_diff>